<commit_message>
Updating hands-on with last package versions.
</commit_message>
<xml_diff>
--- a/DAY1/_00 - Motivation/motivation.pptx
+++ b/DAY1/_00 - Motivation/motivation.pptx
@@ -6,8 +6,9 @@
   </p:sldMasterIdLst>
   <p:sldIdLst>
     <p:sldId id="256" r:id="rId2"/>
-    <p:sldId id="260" r:id="rId3"/>
-    <p:sldId id="261" r:id="rId4"/>
+    <p:sldId id="262" r:id="rId3"/>
+    <p:sldId id="260" r:id="rId4"/>
+    <p:sldId id="261" r:id="rId5"/>
   </p:sldIdLst>
   <p:sldSz cx="12192000" cy="6858000"/>
   <p:notesSz cx="6858000" cy="9144000"/>
@@ -263,7 +264,7 @@
           <a:p>
             <a:fld id="{C3451B09-21F1-2F45-9B85-061DA282C4CB}" type="datetimeFigureOut">
               <a:rPr lang="en-CH" smtClean="0"/>
-              <a:t>11.01.2024</a:t>
+              <a:t>12.01.2024</a:t>
             </a:fld>
             <a:endParaRPr lang="en-CH"/>
           </a:p>
@@ -463,7 +464,7 @@
           <a:p>
             <a:fld id="{C3451B09-21F1-2F45-9B85-061DA282C4CB}" type="datetimeFigureOut">
               <a:rPr lang="en-CH" smtClean="0"/>
-              <a:t>11.01.2024</a:t>
+              <a:t>12.01.2024</a:t>
             </a:fld>
             <a:endParaRPr lang="en-CH"/>
           </a:p>
@@ -673,7 +674,7 @@
           <a:p>
             <a:fld id="{C3451B09-21F1-2F45-9B85-061DA282C4CB}" type="datetimeFigureOut">
               <a:rPr lang="en-CH" smtClean="0"/>
-              <a:t>11.01.2024</a:t>
+              <a:t>12.01.2024</a:t>
             </a:fld>
             <a:endParaRPr lang="en-CH"/>
           </a:p>
@@ -873,7 +874,7 @@
           <a:p>
             <a:fld id="{C3451B09-21F1-2F45-9B85-061DA282C4CB}" type="datetimeFigureOut">
               <a:rPr lang="en-CH" smtClean="0"/>
-              <a:t>11.01.2024</a:t>
+              <a:t>12.01.2024</a:t>
             </a:fld>
             <a:endParaRPr lang="en-CH"/>
           </a:p>
@@ -1149,7 +1150,7 @@
           <a:p>
             <a:fld id="{C3451B09-21F1-2F45-9B85-061DA282C4CB}" type="datetimeFigureOut">
               <a:rPr lang="en-CH" smtClean="0"/>
-              <a:t>11.01.2024</a:t>
+              <a:t>12.01.2024</a:t>
             </a:fld>
             <a:endParaRPr lang="en-CH"/>
           </a:p>
@@ -1417,7 +1418,7 @@
           <a:p>
             <a:fld id="{C3451B09-21F1-2F45-9B85-061DA282C4CB}" type="datetimeFigureOut">
               <a:rPr lang="en-CH" smtClean="0"/>
-              <a:t>11.01.2024</a:t>
+              <a:t>12.01.2024</a:t>
             </a:fld>
             <a:endParaRPr lang="en-CH"/>
           </a:p>
@@ -1832,7 +1833,7 @@
           <a:p>
             <a:fld id="{C3451B09-21F1-2F45-9B85-061DA282C4CB}" type="datetimeFigureOut">
               <a:rPr lang="en-CH" smtClean="0"/>
-              <a:t>11.01.2024</a:t>
+              <a:t>12.01.2024</a:t>
             </a:fld>
             <a:endParaRPr lang="en-CH"/>
           </a:p>
@@ -1974,7 +1975,7 @@
           <a:p>
             <a:fld id="{C3451B09-21F1-2F45-9B85-061DA282C4CB}" type="datetimeFigureOut">
               <a:rPr lang="en-CH" smtClean="0"/>
-              <a:t>11.01.2024</a:t>
+              <a:t>12.01.2024</a:t>
             </a:fld>
             <a:endParaRPr lang="en-CH"/>
           </a:p>
@@ -2087,7 +2088,7 @@
           <a:p>
             <a:fld id="{C3451B09-21F1-2F45-9B85-061DA282C4CB}" type="datetimeFigureOut">
               <a:rPr lang="en-CH" smtClean="0"/>
-              <a:t>11.01.2024</a:t>
+              <a:t>12.01.2024</a:t>
             </a:fld>
             <a:endParaRPr lang="en-CH"/>
           </a:p>
@@ -2400,7 +2401,7 @@
           <a:p>
             <a:fld id="{C3451B09-21F1-2F45-9B85-061DA282C4CB}" type="datetimeFigureOut">
               <a:rPr lang="en-CH" smtClean="0"/>
-              <a:t>11.01.2024</a:t>
+              <a:t>12.01.2024</a:t>
             </a:fld>
             <a:endParaRPr lang="en-CH"/>
           </a:p>
@@ -2689,7 +2690,7 @@
           <a:p>
             <a:fld id="{C3451B09-21F1-2F45-9B85-061DA282C4CB}" type="datetimeFigureOut">
               <a:rPr lang="en-CH" smtClean="0"/>
-              <a:t>11.01.2024</a:t>
+              <a:t>12.01.2024</a:t>
             </a:fld>
             <a:endParaRPr lang="en-CH"/>
           </a:p>
@@ -2934,7 +2935,7 @@
             <a:fld id="{C3451B09-21F1-2F45-9B85-061DA282C4CB}" type="datetimeFigureOut">
               <a:rPr lang="en-CH" smtClean="0"/>
               <a:pPr/>
-              <a:t>11.01.2024</a:t>
+              <a:t>12.01.2024</a:t>
             </a:fld>
             <a:endParaRPr lang="en-CH" dirty="0"/>
           </a:p>
@@ -3463,6 +3464,134 @@
           <p:cNvPr id="2" name="Title 1">
             <a:extLst>
               <a:ext uri="{FF2B5EF4-FFF2-40B4-BE49-F238E27FC236}">
+                <a16:creationId xmlns:a16="http://schemas.microsoft.com/office/drawing/2014/main" id="{04D52649-786B-EA63-8B36-A098D6E2F021}"/>
+              </a:ext>
+            </a:extLst>
+          </p:cNvPr>
+          <p:cNvSpPr>
+            <a:spLocks noGrp="1"/>
+          </p:cNvSpPr>
+          <p:nvPr>
+            <p:ph type="title"/>
+          </p:nvPr>
+        </p:nvSpPr>
+        <p:spPr/>
+        <p:txBody>
+          <a:bodyPr/>
+          <a:lstStyle/>
+          <a:p>
+            <a:r>
+              <a:rPr lang="en-CH" dirty="0"/>
+              <a:t>Thanks to…</a:t>
+            </a:r>
+          </a:p>
+        </p:txBody>
+      </p:sp>
+      <p:sp>
+        <p:nvSpPr>
+          <p:cNvPr id="3" name="Content Placeholder 2">
+            <a:extLst>
+              <a:ext uri="{FF2B5EF4-FFF2-40B4-BE49-F238E27FC236}">
+                <a16:creationId xmlns:a16="http://schemas.microsoft.com/office/drawing/2014/main" id="{1EA0977B-6D76-D487-8B3F-56AAB3D5BE26}"/>
+              </a:ext>
+            </a:extLst>
+          </p:cNvPr>
+          <p:cNvSpPr>
+            <a:spLocks noGrp="1"/>
+          </p:cNvSpPr>
+          <p:nvPr>
+            <p:ph idx="1"/>
+          </p:nvPr>
+        </p:nvSpPr>
+        <p:spPr/>
+        <p:txBody>
+          <a:bodyPr/>
+          <a:lstStyle/>
+          <a:p>
+            <a:pPr marL="0" indent="0">
+              <a:buNone/>
+            </a:pPr>
+            <a:r>
+              <a:rPr lang="en-CH" dirty="0"/>
+              <a:t>Organisers</a:t>
+            </a:r>
+          </a:p>
+          <a:p>
+            <a:r>
+              <a:rPr lang="en-CH" dirty="0"/>
+              <a:t>Susanna Bisogni</a:t>
+            </a:r>
+          </a:p>
+          <a:p>
+            <a:r>
+              <a:rPr lang="en-CH" dirty="0"/>
+              <a:t>Adriana Gargiulo</a:t>
+            </a:r>
+          </a:p>
+          <a:p>
+            <a:r>
+              <a:rPr lang="en-CH" dirty="0"/>
+              <a:t>Marco Scodeggio</a:t>
+            </a:r>
+          </a:p>
+          <a:p>
+            <a:r>
+              <a:rPr lang="en-CH" dirty="0"/>
+              <a:t>Marco Fumana</a:t>
+            </a:r>
+          </a:p>
+          <a:p>
+            <a:pPr marL="0" indent="0">
+              <a:buNone/>
+            </a:pPr>
+            <a:endParaRPr lang="en-CH" dirty="0"/>
+          </a:p>
+          <a:p>
+            <a:pPr marL="0" indent="0">
+              <a:buNone/>
+            </a:pPr>
+            <a:r>
+              <a:rPr lang="en-CH" dirty="0"/>
+              <a:t>And to the entire INAF for the support.</a:t>
+            </a:r>
+          </a:p>
+        </p:txBody>
+      </p:sp>
+    </p:spTree>
+    <p:extLst>
+      <p:ext uri="{BB962C8B-B14F-4D97-AF65-F5344CB8AC3E}">
+        <p14:creationId xmlns:p14="http://schemas.microsoft.com/office/powerpoint/2010/main" val="2170189667"/>
+      </p:ext>
+    </p:extLst>
+  </p:cSld>
+  <p:clrMapOvr>
+    <a:masterClrMapping/>
+  </p:clrMapOvr>
+</p:sld>
+</file>
+
+<file path=ppt/slides/slide3.xml><?xml version="1.0" encoding="utf-8"?>
+<p:sld xmlns:a="http://schemas.openxmlformats.org/drawingml/2006/main" xmlns:r="http://schemas.openxmlformats.org/officeDocument/2006/relationships" xmlns:p="http://schemas.openxmlformats.org/presentationml/2006/main">
+  <p:cSld>
+    <p:spTree>
+      <p:nvGrpSpPr>
+        <p:cNvPr id="1" name=""/>
+        <p:cNvGrpSpPr/>
+        <p:nvPr/>
+      </p:nvGrpSpPr>
+      <p:grpSpPr>
+        <a:xfrm>
+          <a:off x="0" y="0"/>
+          <a:ext cx="0" cy="0"/>
+          <a:chOff x="0" y="0"/>
+          <a:chExt cx="0" cy="0"/>
+        </a:xfrm>
+      </p:grpSpPr>
+      <p:sp>
+        <p:nvSpPr>
+          <p:cNvPr id="2" name="Title 1">
+            <a:extLst>
+              <a:ext uri="{FF2B5EF4-FFF2-40B4-BE49-F238E27FC236}">
                 <a16:creationId xmlns:a16="http://schemas.microsoft.com/office/drawing/2014/main" id="{8C9176F2-FD0F-6B08-8DFB-5B9FB967960C}"/>
               </a:ext>
             </a:extLst>
@@ -3536,7 +3665,7 @@
 </p:sld>
 </file>
 
-<file path=ppt/slides/slide3.xml><?xml version="1.0" encoding="utf-8"?>
+<file path=ppt/slides/slide4.xml><?xml version="1.0" encoding="utf-8"?>
 <p:sld xmlns:a="http://schemas.openxmlformats.org/drawingml/2006/main" xmlns:r="http://schemas.openxmlformats.org/officeDocument/2006/relationships" xmlns:p="http://schemas.openxmlformats.org/presentationml/2006/main">
   <p:cSld>
     <p:spTree>

</xml_diff>